<commit_message>
chore: update mug-30-slides-emiliano.pptx content
The PowerPoint file `mug-30-slides-emiliano.pptx` was updated.
- Changes may include slide content, formatting, or embedded elements.
- Specific modifications are not detailed due to the binary nature of the file.
</commit_message>
<xml_diff>
--- a/slides/mug-30-slides-emiliano.pptx
+++ b/slides/mug-30-slides-emiliano.pptx
@@ -5425,6 +5425,36 @@
               <a:defRPr/>
             </a:pPr>
             <a:r>
+              <a:rPr kumimoji="0" lang="en-US" sz="5400" b="1" i="0" u="none" strike="noStrike" kern="1200" cap="none" spc="-50" normalizeH="0" baseline="0" noProof="0" dirty="0" err="1">
+                <a:ln w="3175">
+                  <a:noFill/>
+                </a:ln>
+                <a:solidFill>
+                  <a:schemeClr val="accent6"/>
+                </a:solidFill>
+                <a:effectLst/>
+                <a:uLnTx/>
+                <a:uFillTx/>
+                <a:latin typeface="Segoe UI"/>
+                <a:ea typeface="+mn-ea"/>
+                <a:cs typeface="Segoe UI"/>
+              </a:rPr>
+              <a:t>Documentaci</a:t>
+            </a:r>
+            <a:r>
+              <a:rPr lang="en-US" sz="5400" b="1" spc="-50" dirty="0">
+                <a:ln w="3175">
+                  <a:noFill/>
+                </a:ln>
+                <a:solidFill>
+                  <a:schemeClr val="accent6"/>
+                </a:solidFill>
+                <a:latin typeface="Segoe UI"/>
+                <a:cs typeface="Segoe UI"/>
+              </a:rPr>
+              <a:t>ó</a:t>
+            </a:r>
+            <a:r>
               <a:rPr kumimoji="0" lang="en-US" sz="5400" b="1" i="0" u="none" strike="noStrike" kern="1200" cap="none" spc="-50" normalizeH="0" baseline="0" noProof="0" dirty="0">
                 <a:ln w="3175">
                   <a:noFill/>
@@ -5439,7 +5469,7 @@
                 <a:ea typeface="+mn-ea"/>
                 <a:cs typeface="Segoe UI"/>
               </a:rPr>
-              <a:t>Documentation</a:t>
+              <a:t>n</a:t>
             </a:r>
             <a:r>
               <a:rPr kumimoji="0" lang="en-US" sz="5400" b="1" i="0" u="none" strike="noStrike" kern="1200" cap="none" spc="-50" normalizeH="0" baseline="0" noProof="0" dirty="0">
@@ -5868,7 +5898,7 @@
               <a:rPr lang="it-IT" dirty="0">
                 <a:latin typeface="Segoe UI Semibold"/>
               </a:rPr>
-              <a:t>Papá de las mas hermosa</a:t>
+              <a:t>Papá de las más hermosa</a:t>
             </a:r>
           </a:p>
           <a:p>
@@ -8019,7 +8049,7 @@
                                           </p:stCondLst>
                                         </p:cTn>
                                         <p:tgtEl>
-                                          <p:spTgt spid="4"/>
+                                          <p:spTgt spid="6"/>
                                         </p:tgtEl>
                                         <p:attrNameLst>
                                           <p:attrName>style.visibility</p:attrName>
@@ -8033,7 +8063,7 @@
                                       <p:cBhvr>
                                         <p:cTn id="7" dur="500"/>
                                         <p:tgtEl>
-                                          <p:spTgt spid="4"/>
+                                          <p:spTgt spid="6"/>
                                         </p:tgtEl>
                                       </p:cBhvr>
                                     </p:animEffect>
@@ -8054,7 +8084,7 @@
                                           </p:stCondLst>
                                         </p:cTn>
                                         <p:tgtEl>
-                                          <p:spTgt spid="9"/>
+                                          <p:spTgt spid="8"/>
                                         </p:tgtEl>
                                         <p:attrNameLst>
                                           <p:attrName>style.visibility</p:attrName>
@@ -8068,7 +8098,7 @@
                                       <p:cBhvr>
                                         <p:cTn id="10" dur="500"/>
                                         <p:tgtEl>
-                                          <p:spTgt spid="9"/>
+                                          <p:spTgt spid="8"/>
                                         </p:tgtEl>
                                       </p:cBhvr>
                                     </p:animEffect>
@@ -8089,7 +8119,7 @@
                                           </p:stCondLst>
                                         </p:cTn>
                                         <p:tgtEl>
-                                          <p:spTgt spid="3"/>
+                                          <p:spTgt spid="5"/>
                                         </p:tgtEl>
                                         <p:attrNameLst>
                                           <p:attrName>style.visibility</p:attrName>
@@ -8102,129 +8132,6 @@
                                     <p:animEffect transition="in" filter="fade">
                                       <p:cBhvr>
                                         <p:cTn id="13" dur="500"/>
-                                        <p:tgtEl>
-                                          <p:spTgt spid="3"/>
-                                        </p:tgtEl>
-                                      </p:cBhvr>
-                                    </p:animEffect>
-                                  </p:childTnLst>
-                                </p:cTn>
-                              </p:par>
-                            </p:childTnLst>
-                          </p:cTn>
-                        </p:par>
-                      </p:childTnLst>
-                    </p:cTn>
-                  </p:par>
-                  <p:par>
-                    <p:cTn id="14" fill="hold">
-                      <p:stCondLst>
-                        <p:cond delay="indefinite"/>
-                      </p:stCondLst>
-                      <p:childTnLst>
-                        <p:par>
-                          <p:cTn id="15" fill="hold">
-                            <p:stCondLst>
-                              <p:cond delay="0"/>
-                            </p:stCondLst>
-                            <p:childTnLst>
-                              <p:par>
-                                <p:cTn id="16" presetID="10" presetClass="entr" presetSubtype="0" fill="hold" grpId="0" nodeType="clickEffect">
-                                  <p:stCondLst>
-                                    <p:cond delay="0"/>
-                                  </p:stCondLst>
-                                  <p:childTnLst>
-                                    <p:set>
-                                      <p:cBhvr>
-                                        <p:cTn id="17" dur="1" fill="hold">
-                                          <p:stCondLst>
-                                            <p:cond delay="0"/>
-                                          </p:stCondLst>
-                                        </p:cTn>
-                                        <p:tgtEl>
-                                          <p:spTgt spid="6"/>
-                                        </p:tgtEl>
-                                        <p:attrNameLst>
-                                          <p:attrName>style.visibility</p:attrName>
-                                        </p:attrNameLst>
-                                      </p:cBhvr>
-                                      <p:to>
-                                        <p:strVal val="visible"/>
-                                      </p:to>
-                                    </p:set>
-                                    <p:animEffect transition="in" filter="fade">
-                                      <p:cBhvr>
-                                        <p:cTn id="18" dur="500"/>
-                                        <p:tgtEl>
-                                          <p:spTgt spid="6"/>
-                                        </p:tgtEl>
-                                      </p:cBhvr>
-                                    </p:animEffect>
-                                  </p:childTnLst>
-                                </p:cTn>
-                              </p:par>
-                              <p:par>
-                                <p:cTn id="19" presetID="10" presetClass="entr" presetSubtype="0" fill="hold" nodeType="withEffect">
-                                  <p:stCondLst>
-                                    <p:cond delay="0"/>
-                                  </p:stCondLst>
-                                  <p:childTnLst>
-                                    <p:set>
-                                      <p:cBhvr>
-                                        <p:cTn id="20" dur="1" fill="hold">
-                                          <p:stCondLst>
-                                            <p:cond delay="0"/>
-                                          </p:stCondLst>
-                                        </p:cTn>
-                                        <p:tgtEl>
-                                          <p:spTgt spid="8"/>
-                                        </p:tgtEl>
-                                        <p:attrNameLst>
-                                          <p:attrName>style.visibility</p:attrName>
-                                        </p:attrNameLst>
-                                      </p:cBhvr>
-                                      <p:to>
-                                        <p:strVal val="visible"/>
-                                      </p:to>
-                                    </p:set>
-                                    <p:animEffect transition="in" filter="fade">
-                                      <p:cBhvr>
-                                        <p:cTn id="21" dur="500"/>
-                                        <p:tgtEl>
-                                          <p:spTgt spid="8"/>
-                                        </p:tgtEl>
-                                      </p:cBhvr>
-                                    </p:animEffect>
-                                  </p:childTnLst>
-                                </p:cTn>
-                              </p:par>
-                              <p:par>
-                                <p:cTn id="22" presetID="10" presetClass="entr" presetSubtype="0" fill="hold" grpId="0" nodeType="withEffect">
-                                  <p:stCondLst>
-                                    <p:cond delay="0"/>
-                                  </p:stCondLst>
-                                  <p:childTnLst>
-                                    <p:set>
-                                      <p:cBhvr>
-                                        <p:cTn id="23" dur="1" fill="hold">
-                                          <p:stCondLst>
-                                            <p:cond delay="0"/>
-                                          </p:stCondLst>
-                                        </p:cTn>
-                                        <p:tgtEl>
-                                          <p:spTgt spid="5"/>
-                                        </p:tgtEl>
-                                        <p:attrNameLst>
-                                          <p:attrName>style.visibility</p:attrName>
-                                        </p:attrNameLst>
-                                      </p:cBhvr>
-                                      <p:to>
-                                        <p:strVal val="visible"/>
-                                      </p:to>
-                                    </p:set>
-                                    <p:animEffect transition="in" filter="fade">
-                                      <p:cBhvr>
-                                        <p:cTn id="24" dur="500"/>
                                         <p:tgtEl>
                                           <p:spTgt spid="5"/>
                                         </p:tgtEl>
@@ -8261,8 +8168,6 @@
       </p:par>
     </p:tnLst>
     <p:bldLst>
-      <p:bldP spid="3" grpId="0"/>
-      <p:bldP spid="4" grpId="0"/>
       <p:bldP spid="5" grpId="0"/>
       <p:bldP spid="6" grpId="0"/>
     </p:bldLst>
@@ -8381,7 +8286,7 @@
               <a:t> mi </a:t>
             </a:r>
             <a:r>
-              <a:rPr lang="en-US" sz="6000">
+              <a:rPr lang="en-US" sz="6000" dirty="0" err="1">
                 <a:latin typeface="Segoe UI Semibold"/>
                 <a:cs typeface="Segoe UI"/>
               </a:rPr>
@@ -9011,7 +8916,7 @@
         </p:nvSpPr>
         <p:spPr>
           <a:xfrm>
-            <a:off x="6715658" y="1436398"/>
+            <a:off x="6469824" y="1351507"/>
             <a:ext cx="5089766" cy="4154984"/>
           </a:xfrm>
           <a:prstGeom prst="rect">
@@ -9129,7 +9034,7 @@
         </p:blipFill>
         <p:spPr bwMode="auto">
           <a:xfrm>
-            <a:off x="984997" y="936399"/>
+            <a:off x="632410" y="936401"/>
             <a:ext cx="5344085" cy="4985197"/>
           </a:xfrm>
           <a:prstGeom prst="rect">

</xml_diff>